<commit_message>
spelled my last name correctly
</commit_message>
<xml_diff>
--- a/Presentation_Slides.pptx
+++ b/Presentation_Slides.pptx
@@ -208,7 +208,7 @@
           <a:p>
             <a:fld id="{277151B7-E865-BC45-B0E9-143E33B157DC}" type="datetimeFigureOut">
               <a:rPr lang="en-US" smtClean="0"/>
-              <a:t>7/30/20</a:t>
+              <a:t>7/30/2020</a:t>
             </a:fld>
             <a:endParaRPr lang="en-US"/>
           </a:p>
@@ -624,7 +624,7 @@
           <a:p>
             <a:fld id="{F4D57BDD-E64A-4D27-8978-82FFCA18A12C}" type="datetimeFigureOut">
               <a:rPr lang="en-US" smtClean="0"/>
-              <a:t>7/30/20</a:t>
+              <a:t>7/30/2020</a:t>
             </a:fld>
             <a:endParaRPr lang="en-US"/>
           </a:p>
@@ -833,7 +833,7 @@
           <a:p>
             <a:fld id="{F4D57BDD-E64A-4D27-8978-82FFCA18A12C}" type="datetimeFigureOut">
               <a:rPr lang="en-US" smtClean="0"/>
-              <a:t>7/30/20</a:t>
+              <a:t>7/30/2020</a:t>
             </a:fld>
             <a:endParaRPr lang="en-US"/>
           </a:p>
@@ -1041,7 +1041,7 @@
           <a:p>
             <a:fld id="{F4D57BDD-E64A-4D27-8978-82FFCA18A12C}" type="datetimeFigureOut">
               <a:rPr lang="en-US" smtClean="0"/>
-              <a:t>7/30/20</a:t>
+              <a:t>7/30/2020</a:t>
             </a:fld>
             <a:endParaRPr lang="en-US"/>
           </a:p>
@@ -1239,7 +1239,7 @@
           <a:p>
             <a:fld id="{F4D57BDD-E64A-4D27-8978-82FFCA18A12C}" type="datetimeFigureOut">
               <a:rPr lang="en-US" smtClean="0"/>
-              <a:t>7/30/20</a:t>
+              <a:t>7/30/2020</a:t>
             </a:fld>
             <a:endParaRPr lang="en-US"/>
           </a:p>
@@ -1515,7 +1515,7 @@
           <a:p>
             <a:fld id="{F4D57BDD-E64A-4D27-8978-82FFCA18A12C}" type="datetimeFigureOut">
               <a:rPr lang="en-US" smtClean="0"/>
-              <a:t>7/30/20</a:t>
+              <a:t>7/30/2020</a:t>
             </a:fld>
             <a:endParaRPr lang="en-US"/>
           </a:p>
@@ -1787,7 +1787,7 @@
           <a:p>
             <a:fld id="{F4D57BDD-E64A-4D27-8978-82FFCA18A12C}" type="datetimeFigureOut">
               <a:rPr lang="en-US" smtClean="0"/>
-              <a:t>7/30/20</a:t>
+              <a:t>7/30/2020</a:t>
             </a:fld>
             <a:endParaRPr lang="en-US"/>
           </a:p>
@@ -2201,7 +2201,7 @@
           <a:p>
             <a:fld id="{F4D57BDD-E64A-4D27-8978-82FFCA18A12C}" type="datetimeFigureOut">
               <a:rPr lang="en-US" smtClean="0"/>
-              <a:t>7/30/20</a:t>
+              <a:t>7/30/2020</a:t>
             </a:fld>
             <a:endParaRPr lang="en-US"/>
           </a:p>
@@ -2348,7 +2348,7 @@
           <a:p>
             <a:fld id="{F4D57BDD-E64A-4D27-8978-82FFCA18A12C}" type="datetimeFigureOut">
               <a:rPr lang="en-US" smtClean="0"/>
-              <a:t>7/30/20</a:t>
+              <a:t>7/30/2020</a:t>
             </a:fld>
             <a:endParaRPr lang="en-US"/>
           </a:p>
@@ -2461,7 +2461,7 @@
           <a:p>
             <a:fld id="{F4D57BDD-E64A-4D27-8978-82FFCA18A12C}" type="datetimeFigureOut">
               <a:rPr lang="en-US" smtClean="0"/>
-              <a:t>7/30/20</a:t>
+              <a:t>7/30/2020</a:t>
             </a:fld>
             <a:endParaRPr lang="en-US"/>
           </a:p>
@@ -2773,7 +2773,7 @@
           <a:p>
             <a:fld id="{F4D57BDD-E64A-4D27-8978-82FFCA18A12C}" type="datetimeFigureOut">
               <a:rPr lang="en-US" smtClean="0"/>
-              <a:t>7/30/20</a:t>
+              <a:t>7/30/2020</a:t>
             </a:fld>
             <a:endParaRPr lang="en-US"/>
           </a:p>
@@ -3064,7 +3064,7 @@
           <a:p>
             <a:fld id="{F4D57BDD-E64A-4D27-8978-82FFCA18A12C}" type="datetimeFigureOut">
               <a:rPr lang="en-US" smtClean="0"/>
-              <a:t>7/30/20</a:t>
+              <a:t>7/30/2020</a:t>
             </a:fld>
             <a:endParaRPr lang="en-US"/>
           </a:p>
@@ -3313,7 +3313,7 @@
             <a:fld id="{F4D57BDD-E64A-4D27-8978-82FFCA18A12C}" type="datetimeFigureOut">
               <a:rPr lang="en-US" smtClean="0"/>
               <a:pPr/>
-              <a:t>7/30/20</a:t>
+              <a:t>7/30/2020</a:t>
             </a:fld>
             <a:endParaRPr lang="en-US" dirty="0"/>
           </a:p>
@@ -5178,7 +5178,7 @@
           <a:p>
             <a:r>
               <a:rPr lang="en-US" sz="2000" b="1" dirty="0"/>
-              <a:t>Gage Thompson, Aaron Ecker</a:t>
+              <a:t>Gage Thompson, Aaron Eaker</a:t>
             </a:r>
           </a:p>
         </p:txBody>

</xml_diff>